<commit_message>
update with in class modifications.
</commit_message>
<xml_diff>
--- a/Slides/On-Campus/05_02_unconciousBias_Logic.pptx
+++ b/Slides/On-Campus/05_02_unconciousBias_Logic.pptx
@@ -228,7 +228,7 @@
           <a:p>
             <a:fld id="{4D7E51A5-B478-1E40-8CBB-0DAA8831E99D}" type="datetimeFigureOut">
               <a:rPr lang="en-US" smtClean="0"/>
-              <a:t>9/22/2021</a:t>
+              <a:t>9/23/21</a:t>
             </a:fld>
             <a:endParaRPr lang="en-US"/>
           </a:p>
@@ -393,7 +393,7 @@
           <a:p>
             <a:fld id="{D0ED587F-861E-6740-9643-E3DDAE89B8D6}" type="datetimeFigureOut">
               <a:rPr lang="en-US" smtClean="0"/>
-              <a:t>9/22/2021</a:t>
+              <a:t>9/23/21</a:t>
             </a:fld>
             <a:endParaRPr lang="en-US"/>
           </a:p>
@@ -12150,8 +12150,8 @@
         </p:nvSpPr>
         <p:spPr>
           <a:xfrm>
-            <a:off x="4757884" y="2115432"/>
-            <a:ext cx="3961227" cy="4661173"/>
+            <a:off x="4757884" y="2213784"/>
+            <a:ext cx="4131794" cy="4661173"/>
           </a:xfrm>
           <a:prstGeom prst="rect">
             <a:avLst/>
@@ -12372,7 +12372,7 @@
         <p:spPr>
           <a:xfrm>
             <a:off x="9228262" y="2198235"/>
-            <a:ext cx="3961227" cy="4708773"/>
+            <a:ext cx="4301851" cy="4708773"/>
           </a:xfrm>
           <a:prstGeom prst="rect">
             <a:avLst/>
@@ -13550,6 +13550,146 @@
       </p:transition>
     </mc:Fallback>
   </mc:AlternateContent>
+  <p:timing>
+    <p:tnLst>
+      <p:par>
+        <p:cTn id="1" dur="indefinite" restart="never" nodeType="tmRoot">
+          <p:childTnLst>
+            <p:seq concurrent="1" nextAc="seek">
+              <p:cTn id="2" dur="indefinite" nodeType="mainSeq">
+                <p:childTnLst>
+                  <p:par>
+                    <p:cTn id="3" fill="hold">
+                      <p:stCondLst>
+                        <p:cond delay="indefinite"/>
+                      </p:stCondLst>
+                      <p:childTnLst>
+                        <p:par>
+                          <p:cTn id="4" fill="hold">
+                            <p:stCondLst>
+                              <p:cond delay="0"/>
+                            </p:stCondLst>
+                            <p:childTnLst>
+                              <p:par>
+                                <p:cTn id="5" presetID="9" presetClass="entr" presetSubtype="0" fill="hold" grpId="0" nodeType="clickEffect">
+                                  <p:stCondLst>
+                                    <p:cond delay="0"/>
+                                  </p:stCondLst>
+                                  <p:childTnLst>
+                                    <p:set>
+                                      <p:cBhvr>
+                                        <p:cTn id="6" dur="1" fill="hold">
+                                          <p:stCondLst>
+                                            <p:cond delay="0"/>
+                                          </p:stCondLst>
+                                        </p:cTn>
+                                        <p:tgtEl>
+                                          <p:spTgt spid="8"/>
+                                        </p:tgtEl>
+                                        <p:attrNameLst>
+                                          <p:attrName>style.visibility</p:attrName>
+                                        </p:attrNameLst>
+                                      </p:cBhvr>
+                                      <p:to>
+                                        <p:strVal val="visible"/>
+                                      </p:to>
+                                    </p:set>
+                                    <p:animEffect transition="in" filter="dissolve">
+                                      <p:cBhvr>
+                                        <p:cTn id="7" dur="500"/>
+                                        <p:tgtEl>
+                                          <p:spTgt spid="8"/>
+                                        </p:tgtEl>
+                                      </p:cBhvr>
+                                    </p:animEffect>
+                                  </p:childTnLst>
+                                </p:cTn>
+                              </p:par>
+                            </p:childTnLst>
+                          </p:cTn>
+                        </p:par>
+                      </p:childTnLst>
+                    </p:cTn>
+                  </p:par>
+                  <p:par>
+                    <p:cTn id="8" fill="hold">
+                      <p:stCondLst>
+                        <p:cond delay="indefinite"/>
+                      </p:stCondLst>
+                      <p:childTnLst>
+                        <p:par>
+                          <p:cTn id="9" fill="hold">
+                            <p:stCondLst>
+                              <p:cond delay="0"/>
+                            </p:stCondLst>
+                            <p:childTnLst>
+                              <p:par>
+                                <p:cTn id="10" presetID="9" presetClass="entr" presetSubtype="0" fill="hold" grpId="0" nodeType="clickEffect">
+                                  <p:stCondLst>
+                                    <p:cond delay="0"/>
+                                  </p:stCondLst>
+                                  <p:childTnLst>
+                                    <p:set>
+                                      <p:cBhvr>
+                                        <p:cTn id="11" dur="1" fill="hold">
+                                          <p:stCondLst>
+                                            <p:cond delay="0"/>
+                                          </p:stCondLst>
+                                        </p:cTn>
+                                        <p:tgtEl>
+                                          <p:spTgt spid="9"/>
+                                        </p:tgtEl>
+                                        <p:attrNameLst>
+                                          <p:attrName>style.visibility</p:attrName>
+                                        </p:attrNameLst>
+                                      </p:cBhvr>
+                                      <p:to>
+                                        <p:strVal val="visible"/>
+                                      </p:to>
+                                    </p:set>
+                                    <p:animEffect transition="in" filter="dissolve">
+                                      <p:cBhvr>
+                                        <p:cTn id="12" dur="500"/>
+                                        <p:tgtEl>
+                                          <p:spTgt spid="9"/>
+                                        </p:tgtEl>
+                                      </p:cBhvr>
+                                    </p:animEffect>
+                                  </p:childTnLst>
+                                </p:cTn>
+                              </p:par>
+                            </p:childTnLst>
+                          </p:cTn>
+                        </p:par>
+                      </p:childTnLst>
+                    </p:cTn>
+                  </p:par>
+                </p:childTnLst>
+              </p:cTn>
+              <p:prevCondLst>
+                <p:cond evt="onPrev" delay="0">
+                  <p:tgtEl>
+                    <p:sldTgt/>
+                  </p:tgtEl>
+                </p:cond>
+              </p:prevCondLst>
+              <p:nextCondLst>
+                <p:cond evt="onNext" delay="0">
+                  <p:tgtEl>
+                    <p:sldTgt/>
+                  </p:tgtEl>
+                </p:cond>
+              </p:nextCondLst>
+            </p:seq>
+          </p:childTnLst>
+        </p:cTn>
+      </p:par>
+    </p:tnLst>
+    <p:bldLst>
+      <p:bldP spid="8" grpId="0"/>
+      <p:bldP spid="9" grpId="0"/>
+    </p:bldLst>
+  </p:timing>
 </p:sld>
 </file>
 
@@ -14345,7 +14485,7 @@
         </p:nvSpPr>
         <p:spPr>
           <a:xfrm>
-            <a:off x="1128890" y="2570994"/>
+            <a:off x="982135" y="2853216"/>
             <a:ext cx="6908800" cy="707886"/>
           </a:xfrm>
           <a:prstGeom prst="rect">

</xml_diff>